<commit_message>
made rough change to overview, added sys arch diagram
</commit_message>
<xml_diff>
--- a/DesignSpec.pptx
+++ b/DesignSpec.pptx
@@ -3502,31 +3502,41 @@
           </a:p>
         </p:txBody>
       </p:sp>
-      <p:sp>
-        <p:nvSpPr>
-          <p:cNvPr id="3" name="Content Placeholder 2">
-            <a:extLst>
-              <a:ext uri="{FF2B5EF4-FFF2-40B4-BE49-F238E27FC236}">
-                <a16:creationId xmlns:a16="http://schemas.microsoft.com/office/drawing/2014/main" id="{E5E487DC-A832-460C-B282-A6FB5081C83E}"/>
-              </a:ext>
-            </a:extLst>
-          </p:cNvPr>
-          <p:cNvSpPr>
-            <a:spLocks noGrp="1"/>
-          </p:cNvSpPr>
+      <p:pic>
+        <p:nvPicPr>
+          <p:cNvPr id="5" name="Content Placeholder 4">
+            <a:extLst>
+              <a:ext uri="{FF2B5EF4-FFF2-40B4-BE49-F238E27FC236}">
+                <a16:creationId xmlns:a16="http://schemas.microsoft.com/office/drawing/2014/main" id="{DE6C5C30-5646-47C8-A0D5-C0349007EB4D}"/>
+              </a:ext>
+            </a:extLst>
+          </p:cNvPr>
+          <p:cNvPicPr>
+            <a:picLocks noGrp="1" noChangeAspect="1"/>
+          </p:cNvPicPr>
           <p:nvPr>
             <p:ph idx="1"/>
           </p:nvPr>
-        </p:nvSpPr>
-        <p:spPr/>
-        <p:txBody>
-          <a:bodyPr/>
-          <a:lstStyle/>
-          <a:p>
-            <a:endParaRPr lang="en-GB"/>
-          </a:p>
-        </p:txBody>
-      </p:sp>
+        </p:nvPicPr>
+        <p:blipFill>
+          <a:blip r:embed="rId2">
+            <a:extLst>
+              <a:ext uri="{28A0092B-C50C-407E-A947-70E740481C1C}">
+                <a14:useLocalDpi xmlns:a14="http://schemas.microsoft.com/office/drawing/2010/main" val="0"/>
+              </a:ext>
+            </a:extLst>
+          </a:blip>
+          <a:stretch>
+            <a:fillRect/>
+          </a:stretch>
+        </p:blipFill>
+        <p:spPr>
+          <a:xfrm>
+            <a:off x="1600200" y="1690688"/>
+            <a:ext cx="8991600" cy="4191000"/>
+          </a:xfrm>
+        </p:spPr>
+      </p:pic>
     </p:spTree>
     <p:extLst>
       <p:ext uri="{BB962C8B-B14F-4D97-AF65-F5344CB8AC3E}">
@@ -3895,11 +3905,11 @@
             </a:r>
             <a:r>
               <a:rPr lang="en-GB" sz="2400" dirty="0"/>
-              <a:t> to the site will be able to view and filter posts (by game) for them to appear on their feed, however to </a:t>
+              <a:t> to the site will be able to view posts by game, however to </a:t>
             </a:r>
             <a:r>
               <a:rPr lang="en-GB" sz="2400" b="1" dirty="0"/>
-              <a:t>like, comment and post</a:t>
+              <a:t>like, comment, view a customised feed and post</a:t>
             </a:r>
             <a:r>
               <a:rPr lang="en-GB" sz="2400" dirty="0"/>
@@ -3949,7 +3959,7 @@
             </a:r>
             <a:r>
               <a:rPr lang="en-GB" sz="2400" dirty="0"/>
-              <a:t>to be approved by an admin. They will also be able to like and comment on all posts.</a:t>
+              <a:t>to be approved by an admin. They will also be able to like/comment on all posts and select which tags appear on their feed.</a:t>
             </a:r>
           </a:p>
           <a:p>

</xml_diff>

<commit_message>
merged with Luke PP
</commit_message>
<xml_diff>
--- a/DesignSpec.pptx
+++ b/DesignSpec.pptx
@@ -7,7 +7,7 @@
   <p:sldIdLst>
     <p:sldId id="256" r:id="rId2"/>
     <p:sldId id="257" r:id="rId3"/>
-    <p:sldId id="258" r:id="rId4"/>
+    <p:sldId id="269" r:id="rId4"/>
     <p:sldId id="259" r:id="rId5"/>
     <p:sldId id="260" r:id="rId6"/>
     <p:sldId id="261" r:id="rId7"/>
@@ -273,7 +273,7 @@
           <a:p>
             <a:fld id="{E1B9D286-FF98-4853-B4BC-644FAEEA3541}" type="datetimeFigureOut">
               <a:rPr lang="en-GB" smtClean="0"/>
-              <a:t>13/02/2019</a:t>
+              <a:t>15/02/2019</a:t>
             </a:fld>
             <a:endParaRPr lang="en-GB"/>
           </a:p>
@@ -473,7 +473,7 @@
           <a:p>
             <a:fld id="{E1B9D286-FF98-4853-B4BC-644FAEEA3541}" type="datetimeFigureOut">
               <a:rPr lang="en-GB" smtClean="0"/>
-              <a:t>13/02/2019</a:t>
+              <a:t>15/02/2019</a:t>
             </a:fld>
             <a:endParaRPr lang="en-GB"/>
           </a:p>
@@ -683,7 +683,7 @@
           <a:p>
             <a:fld id="{E1B9D286-FF98-4853-B4BC-644FAEEA3541}" type="datetimeFigureOut">
               <a:rPr lang="en-GB" smtClean="0"/>
-              <a:t>13/02/2019</a:t>
+              <a:t>15/02/2019</a:t>
             </a:fld>
             <a:endParaRPr lang="en-GB"/>
           </a:p>
@@ -883,7 +883,7 @@
           <a:p>
             <a:fld id="{E1B9D286-FF98-4853-B4BC-644FAEEA3541}" type="datetimeFigureOut">
               <a:rPr lang="en-GB" smtClean="0"/>
-              <a:t>13/02/2019</a:t>
+              <a:t>15/02/2019</a:t>
             </a:fld>
             <a:endParaRPr lang="en-GB"/>
           </a:p>
@@ -1159,7 +1159,7 @@
           <a:p>
             <a:fld id="{E1B9D286-FF98-4853-B4BC-644FAEEA3541}" type="datetimeFigureOut">
               <a:rPr lang="en-GB" smtClean="0"/>
-              <a:t>13/02/2019</a:t>
+              <a:t>15/02/2019</a:t>
             </a:fld>
             <a:endParaRPr lang="en-GB"/>
           </a:p>
@@ -1427,7 +1427,7 @@
           <a:p>
             <a:fld id="{E1B9D286-FF98-4853-B4BC-644FAEEA3541}" type="datetimeFigureOut">
               <a:rPr lang="en-GB" smtClean="0"/>
-              <a:t>13/02/2019</a:t>
+              <a:t>15/02/2019</a:t>
             </a:fld>
             <a:endParaRPr lang="en-GB"/>
           </a:p>
@@ -1842,7 +1842,7 @@
           <a:p>
             <a:fld id="{E1B9D286-FF98-4853-B4BC-644FAEEA3541}" type="datetimeFigureOut">
               <a:rPr lang="en-GB" smtClean="0"/>
-              <a:t>13/02/2019</a:t>
+              <a:t>15/02/2019</a:t>
             </a:fld>
             <a:endParaRPr lang="en-GB"/>
           </a:p>
@@ -1984,7 +1984,7 @@
           <a:p>
             <a:fld id="{E1B9D286-FF98-4853-B4BC-644FAEEA3541}" type="datetimeFigureOut">
               <a:rPr lang="en-GB" smtClean="0"/>
-              <a:t>13/02/2019</a:t>
+              <a:t>15/02/2019</a:t>
             </a:fld>
             <a:endParaRPr lang="en-GB"/>
           </a:p>
@@ -2097,7 +2097,7 @@
           <a:p>
             <a:fld id="{E1B9D286-FF98-4853-B4BC-644FAEEA3541}" type="datetimeFigureOut">
               <a:rPr lang="en-GB" smtClean="0"/>
-              <a:t>13/02/2019</a:t>
+              <a:t>15/02/2019</a:t>
             </a:fld>
             <a:endParaRPr lang="en-GB"/>
           </a:p>
@@ -2410,7 +2410,7 @@
           <a:p>
             <a:fld id="{E1B9D286-FF98-4853-B4BC-644FAEEA3541}" type="datetimeFigureOut">
               <a:rPr lang="en-GB" smtClean="0"/>
-              <a:t>13/02/2019</a:t>
+              <a:t>15/02/2019</a:t>
             </a:fld>
             <a:endParaRPr lang="en-GB"/>
           </a:p>
@@ -2699,7 +2699,7 @@
           <a:p>
             <a:fld id="{E1B9D286-FF98-4853-B4BC-644FAEEA3541}" type="datetimeFigureOut">
               <a:rPr lang="en-GB" smtClean="0"/>
-              <a:t>13/02/2019</a:t>
+              <a:t>15/02/2019</a:t>
             </a:fld>
             <a:endParaRPr lang="en-GB"/>
           </a:p>
@@ -2942,7 +2942,7 @@
           <a:p>
             <a:fld id="{E1B9D286-FF98-4853-B4BC-644FAEEA3541}" type="datetimeFigureOut">
               <a:rPr lang="en-GB" smtClean="0"/>
-              <a:t>13/02/2019</a:t>
+              <a:t>15/02/2019</a:t>
             </a:fld>
             <a:endParaRPr lang="en-GB"/>
           </a:p>
@@ -3504,10 +3504,10 @@
       </p:sp>
       <p:pic>
         <p:nvPicPr>
-          <p:cNvPr id="5" name="Content Placeholder 4">
-            <a:extLst>
-              <a:ext uri="{FF2B5EF4-FFF2-40B4-BE49-F238E27FC236}">
-                <a16:creationId xmlns:a16="http://schemas.microsoft.com/office/drawing/2014/main" id="{DE6C5C30-5646-47C8-A0D5-C0349007EB4D}"/>
+          <p:cNvPr id="7" name="Content Placeholder 6">
+            <a:extLst>
+              <a:ext uri="{FF2B5EF4-FFF2-40B4-BE49-F238E27FC236}">
+                <a16:creationId xmlns:a16="http://schemas.microsoft.com/office/drawing/2014/main" id="{B8F9A9B6-41D4-4FF6-8214-BC2B922BE3D2}"/>
               </a:ext>
             </a:extLst>
           </p:cNvPr>
@@ -3532,8 +3532,8 @@
         </p:blipFill>
         <p:spPr>
           <a:xfrm>
-            <a:off x="1600200" y="1690688"/>
-            <a:ext cx="8991600" cy="4191000"/>
+            <a:off x="1576387" y="1793419"/>
+            <a:ext cx="9039225" cy="4143375"/>
           </a:xfrm>
         </p:spPr>
       </p:pic>
@@ -3867,7 +3867,7 @@
         <p:spPr/>
         <p:txBody>
           <a:bodyPr>
-            <a:normAutofit/>
+            <a:normAutofit lnSpcReduction="10000"/>
           </a:bodyPr>
           <a:lstStyle/>
           <a:p>
@@ -3961,6 +3961,36 @@
               <a:rPr lang="en-GB" sz="2400" dirty="0"/>
               <a:t>to be approved by an admin. They will also be able to like/comment on all posts and select which tags appear on their feed.</a:t>
             </a:r>
+          </a:p>
+          <a:p>
+            <a:pPr marL="0" indent="0">
+              <a:buNone/>
+            </a:pPr>
+            <a:r>
+              <a:rPr lang="en-US" sz="2400" b="1" dirty="0"/>
+              <a:t>Admins</a:t>
+            </a:r>
+            <a:r>
+              <a:rPr lang="en-US" sz="2400" dirty="0"/>
+              <a:t> will be able to </a:t>
+            </a:r>
+            <a:r>
+              <a:rPr lang="en-US" sz="2400" b="1" dirty="0"/>
+              <a:t>remove screenshots and posts </a:t>
+            </a:r>
+            <a:r>
+              <a:rPr lang="en-US" sz="2400" dirty="0"/>
+              <a:t>from any users, as well as see a queue of requested tags from users, and </a:t>
+            </a:r>
+            <a:r>
+              <a:rPr lang="en-US" sz="2400" b="1" dirty="0"/>
+              <a:t>create tags</a:t>
+            </a:r>
+            <a:r>
+              <a:rPr lang="en-US" sz="2400" dirty="0"/>
+              <a:t> accordingly.</a:t>
+            </a:r>
+            <a:endParaRPr lang="en-GB" sz="2400" dirty="0"/>
           </a:p>
           <a:p>
             <a:pPr marL="0" indent="0">
@@ -4059,7 +4089,13 @@
           <a:p>
             <a:r>
               <a:rPr lang="en-GB" sz="1800" dirty="0"/>
-              <a:t>Users will be able to login/logout view and upload pictures with a game tag and optional info tags</a:t>
+              <a:t>Users will be able to login/logout </a:t>
+            </a:r>
+          </a:p>
+          <a:p>
+            <a:r>
+              <a:rPr lang="en-GB" sz="1800" dirty="0"/>
+              <a:t>Users will be to upload pictures with a game tag, optional info tags and an optional short description</a:t>
             </a:r>
           </a:p>
           <a:p>
@@ -4077,7 +4113,13 @@
           <a:p>
             <a:r>
               <a:rPr lang="en-GB" sz="1800" dirty="0"/>
-              <a:t>Users will be to like other users comments and suggest new game tags for their pictures</a:t>
+              <a:t>Users will be to like other users comments </a:t>
+            </a:r>
+          </a:p>
+          <a:p>
+            <a:r>
+              <a:rPr lang="en-GB" sz="1800" dirty="0"/>
+              <a:t>Users will be able to suggest new game tags for their pictures</a:t>
             </a:r>
           </a:p>
           <a:p>
@@ -4103,7 +4145,7 @@
     </p:spTree>
     <p:extLst>
       <p:ext uri="{BB962C8B-B14F-4D97-AF65-F5344CB8AC3E}">
-        <p14:creationId xmlns:p14="http://schemas.microsoft.com/office/powerpoint/2010/main" val="313540688"/>
+        <p14:creationId xmlns:p14="http://schemas.microsoft.com/office/powerpoint/2010/main" val="3121055754"/>
       </p:ext>
     </p:extLst>
   </p:cSld>
@@ -4191,7 +4233,7 @@
             </a:pPr>
             <a:r>
               <a:rPr lang="en-GB" sz="2400" dirty="0"/>
-              <a:t>Robert is a 2nd at the university studying Business, he has a large collection of games on his computer and is interested in showing a community of like-minded individuals some of the screen shots from some of the more obscure games in his collection. He is hoping some of his screenshots will get quite popular and help drive interest for some games he feels should have a bigger following. He doesn’t care much for comments but is interested in providing high quality info tags on his screenshot to provide people with an idea of what the games are all about.</a:t>
+              <a:t>Robert is a 2nd year at the university studying Business, he has a large collection of games on his computer and is interested in showing a community of like-minded individuals some of the screen shots from some of the more obscure games in his collection. He is hoping some of his screenshots will get quite popular and help drive interest for some games he feels should have a bigger following. He doesn’t care much for comments but is interested in providing high quality info tags on his screenshot to provide people with an idea of what the games are all about.</a:t>
             </a:r>
             <a:endParaRPr lang="en-GB" sz="1600" dirty="0"/>
           </a:p>
@@ -4324,15 +4366,7 @@
             </a:pPr>
             <a:r>
               <a:rPr lang="en-GB" sz="2400" dirty="0"/>
-              <a:t>This is Andy. He is a 23 year old </a:t>
-            </a:r>
-            <a:r>
-              <a:rPr lang="en-GB" sz="2400" dirty="0" err="1"/>
-              <a:t>phd</a:t>
-            </a:r>
-            <a:r>
-              <a:rPr lang="en-GB" sz="2400" dirty="0"/>
-              <a:t> student studying maths. In his space time he likes to wind down with some civ. Andy likes to upload his images online in order to get some feedback on his city placement as he doesn’t have a lot of time to practice, he is also interested in viewing other games with similar mechanics and to find out news on the games he is currently viewing. He wants constructive feedback and tips for his play style, so he can learn civ better for when he plays with his friends.</a:t>
+              <a:t>This is Andy. He is a 23 year stockbroker. In his space time he likes to wind down with various strategy games. Andy likes to upload his images online in order to get some feedback on his city placement as he doesn’t have a lot of time to practice, he is also interested in viewing other games with similar mechanics and to find out news on the games he is currently viewing. He wants constructive feedback and tips for his play style, so he can learn games better for when he plays them with his friends.</a:t>
             </a:r>
           </a:p>
         </p:txBody>
@@ -4464,7 +4498,7 @@
             </a:pPr>
             <a:r>
               <a:rPr lang="en-GB" sz="2000" dirty="0"/>
-              <a:t>Jessica is a new English lit student from Germany. She has recently joined the Glasgow gaming society, she has gotten friendly with the 4x group of the society and wants a platform in order to communicate with other players and comment on her friends posts. She is an avid civ player and is interested in showing people her strategies, she would be interested in filtering content that only applies to a particular game and it’s related tags. She’s specifically interested in different uses of wonders in the game and would like a way to find pictures easily by features by highlighting the tags on pictures she is interested in. She’s also interested in keeping the site friendly and welcoming to new users as she would like a platform that other new members of the society could use.</a:t>
+              <a:t>Jessica is a new English lit student from Germany. She has recently joined the Glasgow gaming society, she has gotten friendly with the 4X group of the society and wants a platform in order to communicate with other players and comment on her friends posts. She is an avid civ player and is interested in showing people her strategies, she would be interested in filtering content that only applies to a particular game and it’s related tags. She’s specifically interested in different uses of wonders in the game and would like a way to find pictures easily by features by highlighting the tags on pictures she is interested in. She’s also interested in keeping the site friendly and welcoming to new users as she would like a platform that other new members of the society could use.</a:t>
             </a:r>
             <a:endParaRPr lang="en-GB" sz="2000" dirty="0">
               <a:effectLst/>

</xml_diff>